<commit_message>
improved language setting of template
</commit_message>
<xml_diff>
--- a/content/events/modelica2025/images/SpeakerSocialMediaTemplate.pptx
+++ b/content/events/modelica2025/images/SpeakerSocialMediaTemplate.pptx
@@ -3372,49 +3372,33 @@
           <a:p>
             <a:pPr algn="ctr"/>
             <a:r>
+              <a:rPr lang="en-US" sz="3200" b="1" dirty="0"/>
+              <a:t>[    Your </a:t>
+            </a:r>
+          </a:p>
+          <a:p>
+            <a:pPr algn="ctr"/>
+            <a:r>
+              <a:rPr lang="en-US" sz="3200" b="1" dirty="0"/>
+              <a:t>portrait </a:t>
+            </a:r>
+          </a:p>
+          <a:p>
+            <a:pPr algn="ctr"/>
+            <a:r>
+              <a:rPr lang="en-US" sz="3200" b="1" dirty="0"/>
+              <a:t>picture </a:t>
+            </a:r>
+          </a:p>
+          <a:p>
+            <a:pPr algn="ctr"/>
+            <a:r>
+              <a:rPr lang="en-US" sz="3200" b="1" dirty="0"/>
+              <a:t>here    </a:t>
+            </a:r>
+            <a:r>
               <a:rPr lang="de-DE" sz="3200" b="1" dirty="0"/>
-              <a:t>[    </a:t>
-            </a:r>
-            <a:r>
-              <a:rPr lang="de-DE" sz="3200" b="1" dirty="0" err="1"/>
-              <a:t>Your</a:t>
-            </a:r>
-            <a:r>
-              <a:rPr lang="de-DE" sz="3200" b="1" dirty="0"/>
-              <a:t> </a:t>
-            </a:r>
-          </a:p>
-          <a:p>
-            <a:pPr algn="ctr"/>
-            <a:r>
-              <a:rPr lang="de-DE" sz="3200" b="1" dirty="0" err="1"/>
-              <a:t>portrait</a:t>
-            </a:r>
-            <a:r>
-              <a:rPr lang="de-DE" sz="3200" b="1" dirty="0"/>
-              <a:t> </a:t>
-            </a:r>
-          </a:p>
-          <a:p>
-            <a:pPr algn="ctr"/>
-            <a:r>
-              <a:rPr lang="de-DE" sz="3200" b="1" dirty="0" err="1"/>
-              <a:t>picture</a:t>
-            </a:r>
-            <a:r>
-              <a:rPr lang="de-DE" sz="3200" b="1" dirty="0"/>
-              <a:t> </a:t>
-            </a:r>
-          </a:p>
-          <a:p>
-            <a:pPr algn="ctr"/>
-            <a:r>
-              <a:rPr lang="de-DE" sz="3200" b="1" dirty="0" err="1"/>
-              <a:t>here</a:t>
-            </a:r>
-            <a:r>
-              <a:rPr lang="de-DE" sz="3200" b="1" dirty="0"/>
-              <a:t>    ]</a:t>
+              <a:t>]</a:t>
             </a:r>
           </a:p>
         </p:txBody>
@@ -3583,92 +3567,14 @@
           <a:p>
             <a:pPr algn="ctr"/>
             <a:r>
-              <a:rPr lang="de-DE" sz="2600" dirty="0" err="1">
+              <a:rPr lang="en-US" sz="2600" dirty="0">
                 <a:solidFill>
                   <a:srgbClr val="707A84"/>
                 </a:solidFill>
                 <a:latin typeface="Century Gothic" panose="020B0502020202020204" pitchFamily="34" charset="0"/>
               </a:rPr>
-              <a:t>excited</a:t>
-            </a:r>
-            <a:r>
-              <a:rPr lang="de-DE" sz="2600" dirty="0">
-                <a:solidFill>
-                  <a:srgbClr val="707A84"/>
-                </a:solidFill>
-                <a:latin typeface="Century Gothic" panose="020B0502020202020204" pitchFamily="34" charset="0"/>
-              </a:rPr>
-              <a:t> </a:t>
-            </a:r>
-            <a:r>
-              <a:rPr lang="de-DE" sz="2600" dirty="0" err="1">
-                <a:solidFill>
-                  <a:srgbClr val="707A84"/>
-                </a:solidFill>
-                <a:latin typeface="Century Gothic" panose="020B0502020202020204" pitchFamily="34" charset="0"/>
-              </a:rPr>
-              <a:t>to</a:t>
-            </a:r>
-            <a:r>
-              <a:rPr lang="de-DE" sz="2600" dirty="0">
-                <a:solidFill>
-                  <a:srgbClr val="707A84"/>
-                </a:solidFill>
-                <a:latin typeface="Century Gothic" panose="020B0502020202020204" pitchFamily="34" charset="0"/>
-              </a:rPr>
-              <a:t> </a:t>
-            </a:r>
-            <a:r>
-              <a:rPr lang="de-DE" sz="2600" dirty="0" err="1">
-                <a:solidFill>
-                  <a:srgbClr val="707A84"/>
-                </a:solidFill>
-                <a:latin typeface="Century Gothic" panose="020B0502020202020204" pitchFamily="34" charset="0"/>
-              </a:rPr>
-              <a:t>be</a:t>
-            </a:r>
-            <a:r>
-              <a:rPr lang="de-DE" sz="2600" dirty="0">
-                <a:solidFill>
-                  <a:srgbClr val="707A84"/>
-                </a:solidFill>
-                <a:latin typeface="Century Gothic" panose="020B0502020202020204" pitchFamily="34" charset="0"/>
-              </a:rPr>
-              <a:t> </a:t>
-            </a:r>
-            <a:r>
-              <a:rPr lang="de-DE" sz="2600" dirty="0" err="1">
-                <a:solidFill>
-                  <a:srgbClr val="707A84"/>
-                </a:solidFill>
-                <a:latin typeface="Century Gothic" panose="020B0502020202020204" pitchFamily="34" charset="0"/>
-              </a:rPr>
-              <a:t>presenting</a:t>
-            </a:r>
-            <a:r>
-              <a:rPr lang="de-DE" sz="2600" dirty="0">
-                <a:solidFill>
-                  <a:srgbClr val="707A84"/>
-                </a:solidFill>
-                <a:latin typeface="Century Gothic" panose="020B0502020202020204" pitchFamily="34" charset="0"/>
-              </a:rPr>
-              <a:t> at </a:t>
-            </a:r>
-            <a:r>
-              <a:rPr lang="de-DE" sz="2600" dirty="0" err="1">
-                <a:solidFill>
-                  <a:srgbClr val="707A84"/>
-                </a:solidFill>
-                <a:latin typeface="Century Gothic" panose="020B0502020202020204" pitchFamily="34" charset="0"/>
-              </a:rPr>
-              <a:t>the</a:t>
-            </a:r>
-            <a:endParaRPr lang="de-DE" sz="2600" dirty="0">
-              <a:solidFill>
-                <a:srgbClr val="707A84"/>
-              </a:solidFill>
-              <a:latin typeface="Century Gothic" panose="020B0502020202020204" pitchFamily="34" charset="0"/>
-            </a:endParaRPr>
+              <a:t>excited to be presenting at the</a:t>
+            </a:r>
           </a:p>
         </p:txBody>
       </p:sp>

</xml_diff>